<commit_message>
add algo to minimax
</commit_message>
<xml_diff>
--- a/Presentations/AI - MinMax.pptx
+++ b/Presentations/AI - MinMax.pptx
@@ -5,7 +5,7 @@
     <p:sldMasterId id="2147483648" r:id="rId1"/>
   </p:sldMasterIdLst>
   <p:notesMasterIdLst>
-    <p:notesMasterId r:id="rId9"/>
+    <p:notesMasterId r:id="rId11"/>
   </p:notesMasterIdLst>
   <p:sldIdLst>
     <p:sldId id="256" r:id="rId2"/>
@@ -15,6 +15,8 @@
     <p:sldId id="284" r:id="rId6"/>
     <p:sldId id="285" r:id="rId7"/>
     <p:sldId id="286" r:id="rId8"/>
+    <p:sldId id="287" r:id="rId9"/>
+    <p:sldId id="288" r:id="rId10"/>
   </p:sldIdLst>
   <p:sldSz cx="9144000" cy="6858000" type="screen4x3"/>
   <p:notesSz cx="6858000" cy="9144000"/>
@@ -793,6 +795,174 @@
     <p:extLst>
       <p:ext uri="{BB962C8B-B14F-4D97-AF65-F5344CB8AC3E}">
         <p14:creationId xmlns:p14="http://schemas.microsoft.com/office/powerpoint/2010/main" val="3588666360"/>
+      </p:ext>
+    </p:extLst>
+  </p:cSld>
+  <p:clrMapOvr>
+    <a:masterClrMapping/>
+  </p:clrMapOvr>
+</p:notes>
+</file>
+
+<file path=ppt/notesSlides/notesSlide5.xml><?xml version="1.0" encoding="utf-8"?>
+<p:notes xmlns:a="http://schemas.openxmlformats.org/drawingml/2006/main" xmlns:r="http://schemas.openxmlformats.org/officeDocument/2006/relationships" xmlns:p="http://schemas.openxmlformats.org/presentationml/2006/main">
+  <p:cSld>
+    <p:spTree>
+      <p:nvGrpSpPr>
+        <p:cNvPr id="1" name=""/>
+        <p:cNvGrpSpPr/>
+        <p:nvPr/>
+      </p:nvGrpSpPr>
+      <p:grpSpPr>
+        <a:xfrm>
+          <a:off x="0" y="0"/>
+          <a:ext cx="0" cy="0"/>
+          <a:chOff x="0" y="0"/>
+          <a:chExt cx="0" cy="0"/>
+        </a:xfrm>
+      </p:grpSpPr>
+      <p:sp>
+        <p:nvSpPr>
+          <p:cNvPr id="2" name="Slide Image Placeholder 1"/>
+          <p:cNvSpPr>
+            <a:spLocks noGrp="1" noRot="1" noChangeAspect="1"/>
+          </p:cNvSpPr>
+          <p:nvPr>
+            <p:ph type="sldImg"/>
+          </p:nvPr>
+        </p:nvSpPr>
+        <p:spPr/>
+      </p:sp>
+      <p:sp>
+        <p:nvSpPr>
+          <p:cNvPr id="3" name="Notes Placeholder 2"/>
+          <p:cNvSpPr>
+            <a:spLocks noGrp="1"/>
+          </p:cNvSpPr>
+          <p:nvPr>
+            <p:ph type="body" idx="1"/>
+          </p:nvPr>
+        </p:nvSpPr>
+        <p:spPr/>
+        <p:txBody>
+          <a:bodyPr/>
+          <a:lstStyle/>
+          <a:p>
+            <a:endParaRPr lang="en-US" dirty="0"/>
+          </a:p>
+        </p:txBody>
+      </p:sp>
+      <p:sp>
+        <p:nvSpPr>
+          <p:cNvPr id="4" name="Slide Number Placeholder 3"/>
+          <p:cNvSpPr>
+            <a:spLocks noGrp="1"/>
+          </p:cNvSpPr>
+          <p:nvPr>
+            <p:ph type="sldNum" sz="quarter" idx="10"/>
+          </p:nvPr>
+        </p:nvSpPr>
+        <p:spPr/>
+        <p:txBody>
+          <a:bodyPr/>
+          <a:lstStyle/>
+          <a:p>
+            <a:fld id="{F06D5892-0430-4AF2-93AC-99DFD0427A02}" type="slidenum">
+              <a:rPr lang="en-US" smtClean="0"/>
+              <a:t>8</a:t>
+            </a:fld>
+            <a:endParaRPr lang="en-US"/>
+          </a:p>
+        </p:txBody>
+      </p:sp>
+    </p:spTree>
+    <p:extLst>
+      <p:ext uri="{BB962C8B-B14F-4D97-AF65-F5344CB8AC3E}">
+        <p14:creationId xmlns:p14="http://schemas.microsoft.com/office/powerpoint/2010/main" val="1751271802"/>
+      </p:ext>
+    </p:extLst>
+  </p:cSld>
+  <p:clrMapOvr>
+    <a:masterClrMapping/>
+  </p:clrMapOvr>
+</p:notes>
+</file>
+
+<file path=ppt/notesSlides/notesSlide6.xml><?xml version="1.0" encoding="utf-8"?>
+<p:notes xmlns:a="http://schemas.openxmlformats.org/drawingml/2006/main" xmlns:r="http://schemas.openxmlformats.org/officeDocument/2006/relationships" xmlns:p="http://schemas.openxmlformats.org/presentationml/2006/main">
+  <p:cSld>
+    <p:spTree>
+      <p:nvGrpSpPr>
+        <p:cNvPr id="1" name=""/>
+        <p:cNvGrpSpPr/>
+        <p:nvPr/>
+      </p:nvGrpSpPr>
+      <p:grpSpPr>
+        <a:xfrm>
+          <a:off x="0" y="0"/>
+          <a:ext cx="0" cy="0"/>
+          <a:chOff x="0" y="0"/>
+          <a:chExt cx="0" cy="0"/>
+        </a:xfrm>
+      </p:grpSpPr>
+      <p:sp>
+        <p:nvSpPr>
+          <p:cNvPr id="2" name="Slide Image Placeholder 1"/>
+          <p:cNvSpPr>
+            <a:spLocks noGrp="1" noRot="1" noChangeAspect="1"/>
+          </p:cNvSpPr>
+          <p:nvPr>
+            <p:ph type="sldImg"/>
+          </p:nvPr>
+        </p:nvSpPr>
+        <p:spPr/>
+      </p:sp>
+      <p:sp>
+        <p:nvSpPr>
+          <p:cNvPr id="3" name="Notes Placeholder 2"/>
+          <p:cNvSpPr>
+            <a:spLocks noGrp="1"/>
+          </p:cNvSpPr>
+          <p:nvPr>
+            <p:ph type="body" idx="1"/>
+          </p:nvPr>
+        </p:nvSpPr>
+        <p:spPr/>
+        <p:txBody>
+          <a:bodyPr/>
+          <a:lstStyle/>
+          <a:p>
+            <a:endParaRPr lang="en-US" dirty="0"/>
+          </a:p>
+        </p:txBody>
+      </p:sp>
+      <p:sp>
+        <p:nvSpPr>
+          <p:cNvPr id="4" name="Slide Number Placeholder 3"/>
+          <p:cNvSpPr>
+            <a:spLocks noGrp="1"/>
+          </p:cNvSpPr>
+          <p:nvPr>
+            <p:ph type="sldNum" sz="quarter" idx="10"/>
+          </p:nvPr>
+        </p:nvSpPr>
+        <p:spPr/>
+        <p:txBody>
+          <a:bodyPr/>
+          <a:lstStyle/>
+          <a:p>
+            <a:fld id="{F06D5892-0430-4AF2-93AC-99DFD0427A02}" type="slidenum">
+              <a:rPr lang="en-US" smtClean="0"/>
+              <a:t>9</a:t>
+            </a:fld>
+            <a:endParaRPr lang="en-US"/>
+          </a:p>
+        </p:txBody>
+      </p:sp>
+    </p:spTree>
+    <p:extLst>
+      <p:ext uri="{BB962C8B-B14F-4D97-AF65-F5344CB8AC3E}">
+        <p14:creationId xmlns:p14="http://schemas.microsoft.com/office/powerpoint/2010/main" val="1751271802"/>
       </p:ext>
     </p:extLst>
   </p:cSld>
@@ -4196,17 +4366,7 @@
                   </a:schemeClr>
                 </a:solidFill>
               </a:rPr>
-              <a:t>A player gain is a loss </a:t>
-            </a:r>
-            <a:r>
-              <a:rPr lang="en-US" sz="2800" b="1" dirty="0" smtClean="0">
-                <a:solidFill>
-                  <a:schemeClr val="accent5">
-                    <a:lumMod val="75000"/>
-                  </a:schemeClr>
-                </a:solidFill>
-              </a:rPr>
-              <a:t>for the other player.</a:t>
+              <a:t>A player gain is a loss for the other player.</a:t>
             </a:r>
           </a:p>
           <a:p>
@@ -4224,13 +4384,6 @@
               </a:rPr>
               <a:t>A player loss is a gain for the other player.</a:t>
             </a:r>
-            <a:endParaRPr lang="en-US" sz="2800" b="1" dirty="0" smtClean="0">
-              <a:solidFill>
-                <a:schemeClr val="accent5">
-                  <a:lumMod val="75000"/>
-                </a:schemeClr>
-              </a:solidFill>
-            </a:endParaRPr>
           </a:p>
           <a:p>
             <a:endParaRPr lang="en-US" sz="2800" b="1" dirty="0">
@@ -4337,13 +4490,6 @@
               </a:rPr>
               <a:t>Minimize the value of the other player’s next action.</a:t>
             </a:r>
-            <a:endParaRPr lang="en-US" sz="2800" b="1" dirty="0" smtClean="0">
-              <a:solidFill>
-                <a:schemeClr val="accent6">
-                  <a:lumMod val="75000"/>
-                </a:schemeClr>
-              </a:solidFill>
-            </a:endParaRPr>
           </a:p>
           <a:p>
             <a:pPr marL="285750" indent="-285750">
@@ -15469,6 +15615,1416 @@
     <p:extLst>
       <p:ext uri="{BB962C8B-B14F-4D97-AF65-F5344CB8AC3E}">
         <p14:creationId xmlns:p14="http://schemas.microsoft.com/office/powerpoint/2010/main" val="3456066236"/>
+      </p:ext>
+    </p:extLst>
+  </p:cSld>
+  <p:clrMapOvr>
+    <a:masterClrMapping/>
+  </p:clrMapOvr>
+  <p:timing>
+    <p:tnLst>
+      <p:par>
+        <p:cTn id="1" dur="indefinite" restart="never" nodeType="tmRoot"/>
+      </p:par>
+    </p:tnLst>
+  </p:timing>
+</p:sld>
+</file>
+
+<file path=ppt/slides/slide8.xml><?xml version="1.0" encoding="utf-8"?>
+<p:sld xmlns:a="http://schemas.openxmlformats.org/drawingml/2006/main" xmlns:r="http://schemas.openxmlformats.org/officeDocument/2006/relationships" xmlns:p="http://schemas.openxmlformats.org/presentationml/2006/main">
+  <p:cSld>
+    <p:spTree>
+      <p:nvGrpSpPr>
+        <p:cNvPr id="1" name=""/>
+        <p:cNvGrpSpPr/>
+        <p:nvPr/>
+      </p:nvGrpSpPr>
+      <p:grpSpPr>
+        <a:xfrm>
+          <a:off x="0" y="0"/>
+          <a:ext cx="0" cy="0"/>
+          <a:chOff x="0" y="0"/>
+          <a:chExt cx="0" cy="0"/>
+        </a:xfrm>
+      </p:grpSpPr>
+      <p:sp>
+        <p:nvSpPr>
+          <p:cNvPr id="2" name="Title 1"/>
+          <p:cNvSpPr>
+            <a:spLocks noGrp="1"/>
+          </p:cNvSpPr>
+          <p:nvPr>
+            <p:ph type="title"/>
+          </p:nvPr>
+        </p:nvSpPr>
+        <p:spPr>
+          <a:xfrm>
+            <a:off x="457200" y="274638"/>
+            <a:ext cx="8305800" cy="792162"/>
+          </a:xfrm>
+        </p:spPr>
+        <p:txBody>
+          <a:bodyPr>
+            <a:normAutofit/>
+          </a:bodyPr>
+          <a:lstStyle/>
+          <a:p>
+            <a:pPr algn="l"/>
+            <a:r>
+              <a:rPr lang="en-US" dirty="0" smtClean="0">
+                <a:solidFill>
+                  <a:schemeClr val="accent1">
+                    <a:lumMod val="75000"/>
+                  </a:schemeClr>
+                </a:solidFill>
+              </a:rPr>
+              <a:t>Algorithm</a:t>
+            </a:r>
+            <a:endParaRPr lang="en-US" dirty="0">
+              <a:solidFill>
+                <a:schemeClr val="accent1">
+                  <a:lumMod val="75000"/>
+                </a:schemeClr>
+              </a:solidFill>
+            </a:endParaRPr>
+          </a:p>
+        </p:txBody>
+      </p:sp>
+      <p:cxnSp>
+        <p:nvCxnSpPr>
+          <p:cNvPr id="5" name="Straight Connector 4"/>
+          <p:cNvCxnSpPr/>
+          <p:nvPr/>
+        </p:nvCxnSpPr>
+        <p:spPr>
+          <a:xfrm>
+            <a:off x="0" y="990600"/>
+            <a:ext cx="9144000" cy="0"/>
+          </a:xfrm>
+          <a:prstGeom prst="line">
+            <a:avLst/>
+          </a:prstGeom>
+          <a:ln w="19050"/>
+        </p:spPr>
+        <p:style>
+          <a:lnRef idx="1">
+            <a:schemeClr val="accent1"/>
+          </a:lnRef>
+          <a:fillRef idx="0">
+            <a:schemeClr val="accent1"/>
+          </a:fillRef>
+          <a:effectRef idx="0">
+            <a:schemeClr val="accent1"/>
+          </a:effectRef>
+          <a:fontRef idx="minor">
+            <a:schemeClr val="tx1"/>
+          </a:fontRef>
+        </p:style>
+      </p:cxnSp>
+      <p:sp>
+        <p:nvSpPr>
+          <p:cNvPr id="6" name="TextBox 5"/>
+          <p:cNvSpPr txBox="1"/>
+          <p:nvPr/>
+        </p:nvSpPr>
+        <p:spPr>
+          <a:xfrm>
+            <a:off x="0" y="1164136"/>
+            <a:ext cx="4801314" cy="3323987"/>
+          </a:xfrm>
+          <a:prstGeom prst="rect">
+            <a:avLst/>
+          </a:prstGeom>
+          <a:noFill/>
+        </p:spPr>
+        <p:txBody>
+          <a:bodyPr wrap="none" rtlCol="0">
+            <a:spAutoFit/>
+          </a:bodyPr>
+          <a:lstStyle/>
+          <a:p>
+            <a:r>
+              <a:rPr lang="en-US" sz="1600" b="1" dirty="0" smtClean="0"/>
+              <a:t>function </a:t>
+            </a:r>
+            <a:r>
+              <a:rPr lang="en-US" sz="1600" b="1" dirty="0" smtClean="0">
+                <a:solidFill>
+                  <a:srgbClr val="00B050"/>
+                </a:solidFill>
+              </a:rPr>
+              <a:t>Maximize</a:t>
+            </a:r>
+            <a:r>
+              <a:rPr lang="en-US" sz="1600" b="1" dirty="0" smtClean="0"/>
+              <a:t>(state)</a:t>
+            </a:r>
+          </a:p>
+          <a:p>
+            <a:r>
+              <a:rPr lang="en-US" sz="1600" b="1" dirty="0"/>
+              <a:t>	</a:t>
+            </a:r>
+            <a:r>
+              <a:rPr lang="en-US" sz="1600" b="1" dirty="0" smtClean="0"/>
+              <a:t>if terminal(state)</a:t>
+            </a:r>
+          </a:p>
+          <a:p>
+            <a:r>
+              <a:rPr lang="en-US" sz="1600" b="1" dirty="0"/>
+              <a:t>	</a:t>
+            </a:r>
+            <a:r>
+              <a:rPr lang="en-US" sz="1600" b="1" dirty="0" smtClean="0"/>
+              <a:t>	return (null, value(state))</a:t>
+            </a:r>
+          </a:p>
+          <a:p>
+            <a:endParaRPr lang="en-US" sz="1600" b="1" dirty="0"/>
+          </a:p>
+          <a:p>
+            <a:r>
+              <a:rPr lang="en-US" sz="1600" b="1" dirty="0" smtClean="0"/>
+              <a:t>	(</a:t>
+            </a:r>
+            <a:r>
+              <a:rPr lang="en-US" sz="1600" b="1" dirty="0" err="1" smtClean="0"/>
+              <a:t>maxState</a:t>
+            </a:r>
+            <a:r>
+              <a:rPr lang="en-US" sz="1600" b="1" dirty="0" smtClean="0"/>
+              <a:t>, </a:t>
+            </a:r>
+            <a:r>
+              <a:rPr lang="en-US" sz="1600" b="1" dirty="0" err="1" smtClean="0"/>
+              <a:t>maxValue</a:t>
+            </a:r>
+            <a:r>
+              <a:rPr lang="en-US" sz="1600" b="1" dirty="0" smtClean="0"/>
+              <a:t>) = (null, MIN)</a:t>
+            </a:r>
+          </a:p>
+          <a:p>
+            <a:r>
+              <a:rPr lang="en-US" sz="1600" b="1" dirty="0"/>
+              <a:t>	</a:t>
+            </a:r>
+            <a:endParaRPr lang="en-US" sz="1600" b="1" dirty="0" smtClean="0"/>
+          </a:p>
+          <a:p>
+            <a:r>
+              <a:rPr lang="en-US" sz="1600" b="1" dirty="0"/>
+              <a:t>	</a:t>
+            </a:r>
+            <a:r>
+              <a:rPr lang="en-US" sz="1600" b="1" dirty="0" smtClean="0"/>
+              <a:t>for child in </a:t>
+            </a:r>
+            <a:r>
+              <a:rPr lang="en-US" sz="1600" b="1" dirty="0" err="1" smtClean="0"/>
+              <a:t>state.children</a:t>
+            </a:r>
+            <a:endParaRPr lang="en-US" sz="1600" b="1" dirty="0" smtClean="0"/>
+          </a:p>
+          <a:p>
+            <a:r>
+              <a:rPr lang="en-US" sz="1600" b="1" dirty="0"/>
+              <a:t>	</a:t>
+            </a:r>
+            <a:r>
+              <a:rPr lang="en-US" sz="1600" b="1" dirty="0" smtClean="0"/>
+              <a:t>	(_, value) = </a:t>
+            </a:r>
+            <a:r>
+              <a:rPr lang="en-US" sz="1600" b="1" dirty="0" smtClean="0">
+                <a:solidFill>
+                  <a:srgbClr val="C00000"/>
+                </a:solidFill>
+              </a:rPr>
+              <a:t>Minimize</a:t>
+            </a:r>
+            <a:r>
+              <a:rPr lang="en-US" sz="1600" b="1" dirty="0" smtClean="0"/>
+              <a:t>(child)</a:t>
+            </a:r>
+            <a:endParaRPr lang="en-US" sz="1600" dirty="0"/>
+          </a:p>
+          <a:p>
+            <a:r>
+              <a:rPr lang="en-US" sz="1600" b="1" dirty="0" smtClean="0"/>
+              <a:t>		if value &gt; </a:t>
+            </a:r>
+            <a:r>
+              <a:rPr lang="en-US" sz="1600" b="1" dirty="0" err="1" smtClean="0"/>
+              <a:t>maxValue</a:t>
+            </a:r>
+            <a:endParaRPr lang="en-US" sz="1600" b="1" dirty="0" smtClean="0"/>
+          </a:p>
+          <a:p>
+            <a:r>
+              <a:rPr lang="en-US" sz="1600" b="1" dirty="0"/>
+              <a:t>	</a:t>
+            </a:r>
+            <a:r>
+              <a:rPr lang="en-US" sz="1600" b="1" dirty="0" smtClean="0"/>
+              <a:t>		(</a:t>
+            </a:r>
+            <a:r>
+              <a:rPr lang="en-US" sz="1600" b="1" dirty="0" err="1" smtClean="0"/>
+              <a:t>maxState,maxValue</a:t>
+            </a:r>
+            <a:r>
+              <a:rPr lang="en-US" sz="1600" b="1" dirty="0" smtClean="0"/>
+              <a:t>)</a:t>
+            </a:r>
+          </a:p>
+          <a:p>
+            <a:r>
+              <a:rPr lang="en-US" sz="1600" b="1" dirty="0"/>
+              <a:t>	</a:t>
+            </a:r>
+            <a:r>
+              <a:rPr lang="en-US" sz="1600" b="1" dirty="0" smtClean="0"/>
+              <a:t>		= (child, value)</a:t>
+            </a:r>
+          </a:p>
+          <a:p>
+            <a:endParaRPr lang="en-US" sz="1600" b="1" dirty="0"/>
+          </a:p>
+          <a:p>
+            <a:r>
+              <a:rPr lang="en-US" sz="1600" b="1" dirty="0" smtClean="0"/>
+              <a:t>	return (</a:t>
+            </a:r>
+            <a:r>
+              <a:rPr lang="en-US" sz="1600" b="1" dirty="0" err="1" smtClean="0"/>
+              <a:t>maxState</a:t>
+            </a:r>
+            <a:r>
+              <a:rPr lang="en-US" sz="1600" b="1" dirty="0" smtClean="0"/>
+              <a:t>, </a:t>
+            </a:r>
+            <a:r>
+              <a:rPr lang="en-US" sz="1600" b="1" dirty="0" err="1" smtClean="0"/>
+              <a:t>maxValue</a:t>
+            </a:r>
+            <a:r>
+              <a:rPr lang="en-US" sz="1600" b="1" dirty="0" smtClean="0"/>
+              <a:t>)</a:t>
+            </a:r>
+            <a:r>
+              <a:rPr lang="en-US" b="1" dirty="0" smtClean="0"/>
+              <a:t>		</a:t>
+            </a:r>
+          </a:p>
+        </p:txBody>
+      </p:sp>
+      <p:cxnSp>
+        <p:nvCxnSpPr>
+          <p:cNvPr id="4" name="Straight Connector 3"/>
+          <p:cNvCxnSpPr/>
+          <p:nvPr/>
+        </p:nvCxnSpPr>
+        <p:spPr>
+          <a:xfrm>
+            <a:off x="4610100" y="1164134"/>
+            <a:ext cx="38100" cy="3484066"/>
+          </a:xfrm>
+          <a:prstGeom prst="line">
+            <a:avLst/>
+          </a:prstGeom>
+          <a:ln>
+            <a:solidFill>
+              <a:schemeClr val="bg1">
+                <a:lumMod val="50000"/>
+              </a:schemeClr>
+            </a:solidFill>
+            <a:prstDash val="dash"/>
+          </a:ln>
+        </p:spPr>
+        <p:style>
+          <a:lnRef idx="1">
+            <a:schemeClr val="accent1"/>
+          </a:lnRef>
+          <a:fillRef idx="0">
+            <a:schemeClr val="accent1"/>
+          </a:fillRef>
+          <a:effectRef idx="0">
+            <a:schemeClr val="accent1"/>
+          </a:effectRef>
+          <a:fontRef idx="minor">
+            <a:schemeClr val="tx1"/>
+          </a:fontRef>
+        </p:style>
+      </p:cxnSp>
+      <p:cxnSp>
+        <p:nvCxnSpPr>
+          <p:cNvPr id="19" name="Curved Connector 18"/>
+          <p:cNvCxnSpPr/>
+          <p:nvPr/>
+        </p:nvCxnSpPr>
+        <p:spPr>
+          <a:xfrm rot="5400000" flipH="1" flipV="1">
+            <a:off x="3654237" y="1603566"/>
+            <a:ext cx="1378328" cy="1066799"/>
+          </a:xfrm>
+          <a:prstGeom prst="curvedConnector3">
+            <a:avLst/>
+          </a:prstGeom>
+          <a:ln>
+            <a:solidFill>
+              <a:srgbClr val="00B050"/>
+            </a:solidFill>
+            <a:prstDash val="dash"/>
+            <a:tailEnd type="arrow"/>
+          </a:ln>
+        </p:spPr>
+        <p:style>
+          <a:lnRef idx="1">
+            <a:schemeClr val="accent1"/>
+          </a:lnRef>
+          <a:fillRef idx="0">
+            <a:schemeClr val="accent1"/>
+          </a:fillRef>
+          <a:effectRef idx="0">
+            <a:schemeClr val="accent1"/>
+          </a:effectRef>
+          <a:fontRef idx="minor">
+            <a:schemeClr val="tx1"/>
+          </a:fontRef>
+        </p:style>
+      </p:cxnSp>
+      <p:cxnSp>
+        <p:nvCxnSpPr>
+          <p:cNvPr id="22" name="Curved Connector 21"/>
+          <p:cNvCxnSpPr/>
+          <p:nvPr/>
+        </p:nvCxnSpPr>
+        <p:spPr>
+          <a:xfrm rot="10800000">
+            <a:off x="2378035" y="1295403"/>
+            <a:ext cx="4061222" cy="1835529"/>
+          </a:xfrm>
+          <a:prstGeom prst="curvedConnector3">
+            <a:avLst/>
+          </a:prstGeom>
+          <a:ln>
+            <a:solidFill>
+              <a:srgbClr val="FF0000"/>
+            </a:solidFill>
+            <a:prstDash val="dash"/>
+            <a:tailEnd type="arrow"/>
+          </a:ln>
+        </p:spPr>
+        <p:style>
+          <a:lnRef idx="1">
+            <a:schemeClr val="accent1"/>
+          </a:lnRef>
+          <a:fillRef idx="0">
+            <a:schemeClr val="accent1"/>
+          </a:fillRef>
+          <a:effectRef idx="0">
+            <a:schemeClr val="accent1"/>
+          </a:effectRef>
+          <a:fontRef idx="minor">
+            <a:schemeClr val="tx1"/>
+          </a:fontRef>
+        </p:style>
+      </p:cxnSp>
+      <p:cxnSp>
+        <p:nvCxnSpPr>
+          <p:cNvPr id="25" name="Straight Connector 24"/>
+          <p:cNvCxnSpPr/>
+          <p:nvPr/>
+        </p:nvCxnSpPr>
+        <p:spPr>
+          <a:xfrm flipH="1">
+            <a:off x="381001" y="4648200"/>
+            <a:ext cx="8458199" cy="0"/>
+          </a:xfrm>
+          <a:prstGeom prst="line">
+            <a:avLst/>
+          </a:prstGeom>
+          <a:ln>
+            <a:solidFill>
+              <a:schemeClr val="bg1">
+                <a:lumMod val="50000"/>
+              </a:schemeClr>
+            </a:solidFill>
+            <a:prstDash val="dash"/>
+          </a:ln>
+        </p:spPr>
+        <p:style>
+          <a:lnRef idx="1">
+            <a:schemeClr val="accent1"/>
+          </a:lnRef>
+          <a:fillRef idx="0">
+            <a:schemeClr val="accent1"/>
+          </a:fillRef>
+          <a:effectRef idx="0">
+            <a:schemeClr val="accent1"/>
+          </a:effectRef>
+          <a:fontRef idx="minor">
+            <a:schemeClr val="tx1"/>
+          </a:fontRef>
+        </p:style>
+      </p:cxnSp>
+      <p:sp>
+        <p:nvSpPr>
+          <p:cNvPr id="29" name="TextBox 28"/>
+          <p:cNvSpPr txBox="1"/>
+          <p:nvPr/>
+        </p:nvSpPr>
+        <p:spPr>
+          <a:xfrm>
+            <a:off x="3173450" y="5029199"/>
+            <a:ext cx="3406702" cy="1323439"/>
+          </a:xfrm>
+          <a:prstGeom prst="rect">
+            <a:avLst/>
+          </a:prstGeom>
+          <a:noFill/>
+        </p:spPr>
+        <p:txBody>
+          <a:bodyPr wrap="none" rtlCol="0">
+            <a:spAutoFit/>
+          </a:bodyPr>
+          <a:lstStyle/>
+          <a:p>
+            <a:r>
+              <a:rPr lang="en-US" sz="1600" b="1" dirty="0" smtClean="0"/>
+              <a:t>function Minimax(state)</a:t>
+            </a:r>
+          </a:p>
+          <a:p>
+            <a:endParaRPr lang="en-US" sz="1600" b="1" dirty="0"/>
+          </a:p>
+          <a:p>
+            <a:r>
+              <a:rPr lang="en-US" sz="1600" b="1" dirty="0" smtClean="0"/>
+              <a:t>	(child, _) = </a:t>
+            </a:r>
+            <a:r>
+              <a:rPr lang="en-US" sz="1600" b="1" dirty="0" smtClean="0">
+                <a:solidFill>
+                  <a:srgbClr val="00B050"/>
+                </a:solidFill>
+              </a:rPr>
+              <a:t>Maximize</a:t>
+            </a:r>
+            <a:r>
+              <a:rPr lang="en-US" sz="1600" b="1" dirty="0" smtClean="0"/>
+              <a:t>(state)</a:t>
+            </a:r>
+          </a:p>
+          <a:p>
+            <a:endParaRPr lang="en-US" sz="1600" b="1" dirty="0"/>
+          </a:p>
+          <a:p>
+            <a:r>
+              <a:rPr lang="en-US" sz="1600" b="1" dirty="0" smtClean="0"/>
+              <a:t>	return child</a:t>
+            </a:r>
+            <a:endParaRPr lang="en-US" sz="1600" b="1" dirty="0"/>
+          </a:p>
+        </p:txBody>
+      </p:sp>
+      <p:sp>
+        <p:nvSpPr>
+          <p:cNvPr id="31" name="TextBox 30"/>
+          <p:cNvSpPr txBox="1"/>
+          <p:nvPr/>
+        </p:nvSpPr>
+        <p:spPr>
+          <a:xfrm>
+            <a:off x="4572000" y="1152612"/>
+            <a:ext cx="4724399" cy="3293209"/>
+          </a:xfrm>
+          <a:prstGeom prst="rect">
+            <a:avLst/>
+          </a:prstGeom>
+          <a:noFill/>
+        </p:spPr>
+        <p:txBody>
+          <a:bodyPr wrap="square" rtlCol="0">
+            <a:spAutoFit/>
+          </a:bodyPr>
+          <a:lstStyle/>
+          <a:p>
+            <a:r>
+              <a:rPr lang="en-US" sz="1600" b="1" dirty="0" smtClean="0"/>
+              <a:t>function </a:t>
+            </a:r>
+            <a:r>
+              <a:rPr lang="en-US" sz="1600" b="1" dirty="0" smtClean="0">
+                <a:solidFill>
+                  <a:srgbClr val="C00000"/>
+                </a:solidFill>
+              </a:rPr>
+              <a:t>Minimize</a:t>
+            </a:r>
+            <a:r>
+              <a:rPr lang="en-US" sz="1600" b="1" dirty="0" smtClean="0"/>
+              <a:t>(state)</a:t>
+            </a:r>
+          </a:p>
+          <a:p>
+            <a:r>
+              <a:rPr lang="en-US" sz="1600" b="1" dirty="0"/>
+              <a:t>	</a:t>
+            </a:r>
+            <a:r>
+              <a:rPr lang="en-US" sz="1600" b="1" dirty="0" smtClean="0"/>
+              <a:t>if terminal(state)</a:t>
+            </a:r>
+          </a:p>
+          <a:p>
+            <a:r>
+              <a:rPr lang="en-US" sz="1600" b="1" dirty="0"/>
+              <a:t>	</a:t>
+            </a:r>
+            <a:r>
+              <a:rPr lang="en-US" sz="1600" b="1" dirty="0" smtClean="0"/>
+              <a:t>	return (null, value(state))</a:t>
+            </a:r>
+          </a:p>
+          <a:p>
+            <a:endParaRPr lang="en-US" sz="1600" b="1" dirty="0"/>
+          </a:p>
+          <a:p>
+            <a:r>
+              <a:rPr lang="en-US" sz="1600" b="1" dirty="0" smtClean="0"/>
+              <a:t>	(</a:t>
+            </a:r>
+            <a:r>
+              <a:rPr lang="en-US" sz="1600" b="1" dirty="0" err="1" smtClean="0"/>
+              <a:t>minState</a:t>
+            </a:r>
+            <a:r>
+              <a:rPr lang="en-US" sz="1600" b="1" dirty="0" smtClean="0"/>
+              <a:t>, </a:t>
+            </a:r>
+            <a:r>
+              <a:rPr lang="en-US" sz="1600" b="1" dirty="0" err="1" smtClean="0"/>
+              <a:t>minValue</a:t>
+            </a:r>
+            <a:r>
+              <a:rPr lang="en-US" sz="1600" b="1" dirty="0" smtClean="0"/>
+              <a:t>) = (null, MAX)</a:t>
+            </a:r>
+          </a:p>
+          <a:p>
+            <a:r>
+              <a:rPr lang="en-US" sz="1600" b="1" dirty="0"/>
+              <a:t>	</a:t>
+            </a:r>
+            <a:endParaRPr lang="en-US" sz="1600" b="1" dirty="0" smtClean="0"/>
+          </a:p>
+          <a:p>
+            <a:r>
+              <a:rPr lang="en-US" sz="1600" b="1" dirty="0"/>
+              <a:t>	</a:t>
+            </a:r>
+            <a:r>
+              <a:rPr lang="en-US" sz="1600" b="1" dirty="0" smtClean="0"/>
+              <a:t>for child in </a:t>
+            </a:r>
+            <a:r>
+              <a:rPr lang="en-US" sz="1600" b="1" dirty="0" err="1" smtClean="0"/>
+              <a:t>state.children</a:t>
+            </a:r>
+            <a:endParaRPr lang="en-US" sz="1600" b="1" dirty="0" smtClean="0"/>
+          </a:p>
+          <a:p>
+            <a:r>
+              <a:rPr lang="en-US" sz="1600" b="1" dirty="0"/>
+              <a:t>	</a:t>
+            </a:r>
+            <a:r>
+              <a:rPr lang="en-US" sz="1600" b="1" dirty="0" smtClean="0"/>
+              <a:t>	(_, value) = </a:t>
+            </a:r>
+            <a:r>
+              <a:rPr lang="en-US" sz="1600" b="1" dirty="0" smtClean="0">
+                <a:solidFill>
+                  <a:srgbClr val="00B050"/>
+                </a:solidFill>
+              </a:rPr>
+              <a:t>Maximize</a:t>
+            </a:r>
+            <a:r>
+              <a:rPr lang="en-US" sz="1600" b="1" dirty="0" smtClean="0"/>
+              <a:t>(child)</a:t>
+            </a:r>
+            <a:endParaRPr lang="en-US" sz="1600" dirty="0"/>
+          </a:p>
+          <a:p>
+            <a:r>
+              <a:rPr lang="en-US" sz="1600" b="1" dirty="0" smtClean="0"/>
+              <a:t>		if value &lt; </a:t>
+            </a:r>
+            <a:r>
+              <a:rPr lang="en-US" sz="1600" b="1" dirty="0" err="1" smtClean="0"/>
+              <a:t>minValue</a:t>
+            </a:r>
+            <a:endParaRPr lang="en-US" sz="1600" b="1" dirty="0" smtClean="0"/>
+          </a:p>
+          <a:p>
+            <a:r>
+              <a:rPr lang="en-US" sz="1600" b="1" dirty="0"/>
+              <a:t>	</a:t>
+            </a:r>
+            <a:r>
+              <a:rPr lang="en-US" sz="1600" b="1" dirty="0" smtClean="0"/>
+              <a:t>		(</a:t>
+            </a:r>
+            <a:r>
+              <a:rPr lang="en-US" sz="1600" b="1" dirty="0" err="1" smtClean="0"/>
+              <a:t>minState,minValue</a:t>
+            </a:r>
+            <a:r>
+              <a:rPr lang="en-US" sz="1600" b="1" dirty="0" smtClean="0"/>
+              <a:t>) 			= (child, value)</a:t>
+            </a:r>
+          </a:p>
+          <a:p>
+            <a:endParaRPr lang="en-US" sz="1600" b="1" dirty="0"/>
+          </a:p>
+          <a:p>
+            <a:r>
+              <a:rPr lang="en-US" sz="1600" b="1" dirty="0" smtClean="0"/>
+              <a:t>	return (</a:t>
+            </a:r>
+            <a:r>
+              <a:rPr lang="en-US" sz="1600" b="1" dirty="0" err="1" smtClean="0"/>
+              <a:t>minState</a:t>
+            </a:r>
+            <a:r>
+              <a:rPr lang="en-US" sz="1600" b="1" dirty="0" smtClean="0"/>
+              <a:t>, </a:t>
+            </a:r>
+            <a:r>
+              <a:rPr lang="en-US" sz="1600" b="1" dirty="0" err="1" smtClean="0"/>
+              <a:t>minValue</a:t>
+            </a:r>
+            <a:r>
+              <a:rPr lang="en-US" sz="1600" b="1" dirty="0" smtClean="0"/>
+              <a:t>)</a:t>
+            </a:r>
+          </a:p>
+        </p:txBody>
+      </p:sp>
+    </p:spTree>
+    <p:extLst>
+      <p:ext uri="{BB962C8B-B14F-4D97-AF65-F5344CB8AC3E}">
+        <p14:creationId xmlns:p14="http://schemas.microsoft.com/office/powerpoint/2010/main" val="3217184002"/>
+      </p:ext>
+    </p:extLst>
+  </p:cSld>
+  <p:clrMapOvr>
+    <a:masterClrMapping/>
+  </p:clrMapOvr>
+  <p:timing>
+    <p:tnLst>
+      <p:par>
+        <p:cTn id="1" dur="indefinite" restart="never" nodeType="tmRoot"/>
+      </p:par>
+    </p:tnLst>
+  </p:timing>
+</p:sld>
+</file>
+
+<file path=ppt/slides/slide9.xml><?xml version="1.0" encoding="utf-8"?>
+<p:sld xmlns:a="http://schemas.openxmlformats.org/drawingml/2006/main" xmlns:r="http://schemas.openxmlformats.org/officeDocument/2006/relationships" xmlns:p="http://schemas.openxmlformats.org/presentationml/2006/main">
+  <p:cSld>
+    <p:spTree>
+      <p:nvGrpSpPr>
+        <p:cNvPr id="1" name=""/>
+        <p:cNvGrpSpPr/>
+        <p:nvPr/>
+      </p:nvGrpSpPr>
+      <p:grpSpPr>
+        <a:xfrm>
+          <a:off x="0" y="0"/>
+          <a:ext cx="0" cy="0"/>
+          <a:chOff x="0" y="0"/>
+          <a:chExt cx="0" cy="0"/>
+        </a:xfrm>
+      </p:grpSpPr>
+      <p:sp>
+        <p:nvSpPr>
+          <p:cNvPr id="2" name="Title 1"/>
+          <p:cNvSpPr>
+            <a:spLocks noGrp="1"/>
+          </p:cNvSpPr>
+          <p:nvPr>
+            <p:ph type="title"/>
+          </p:nvPr>
+        </p:nvSpPr>
+        <p:spPr>
+          <a:xfrm>
+            <a:off x="457200" y="274638"/>
+            <a:ext cx="8305800" cy="792162"/>
+          </a:xfrm>
+        </p:spPr>
+        <p:txBody>
+          <a:bodyPr>
+            <a:normAutofit/>
+          </a:bodyPr>
+          <a:lstStyle/>
+          <a:p>
+            <a:pPr algn="l"/>
+            <a:r>
+              <a:rPr lang="en-US" dirty="0" smtClean="0">
+                <a:solidFill>
+                  <a:schemeClr val="accent1">
+                    <a:lumMod val="75000"/>
+                  </a:schemeClr>
+                </a:solidFill>
+              </a:rPr>
+              <a:t>Algorithm</a:t>
+            </a:r>
+            <a:endParaRPr lang="en-US" dirty="0">
+              <a:solidFill>
+                <a:schemeClr val="accent1">
+                  <a:lumMod val="75000"/>
+                </a:schemeClr>
+              </a:solidFill>
+            </a:endParaRPr>
+          </a:p>
+        </p:txBody>
+      </p:sp>
+      <p:cxnSp>
+        <p:nvCxnSpPr>
+          <p:cNvPr id="5" name="Straight Connector 4"/>
+          <p:cNvCxnSpPr/>
+          <p:nvPr/>
+        </p:nvCxnSpPr>
+        <p:spPr>
+          <a:xfrm>
+            <a:off x="0" y="990600"/>
+            <a:ext cx="9144000" cy="0"/>
+          </a:xfrm>
+          <a:prstGeom prst="line">
+            <a:avLst/>
+          </a:prstGeom>
+          <a:ln w="19050"/>
+        </p:spPr>
+        <p:style>
+          <a:lnRef idx="1">
+            <a:schemeClr val="accent1"/>
+          </a:lnRef>
+          <a:fillRef idx="0">
+            <a:schemeClr val="accent1"/>
+          </a:fillRef>
+          <a:effectRef idx="0">
+            <a:schemeClr val="accent1"/>
+          </a:effectRef>
+          <a:fontRef idx="minor">
+            <a:schemeClr val="tx1"/>
+          </a:fontRef>
+        </p:style>
+      </p:cxnSp>
+      <p:sp>
+        <p:nvSpPr>
+          <p:cNvPr id="36" name="TextBox 35"/>
+          <p:cNvSpPr txBox="1"/>
+          <p:nvPr/>
+        </p:nvSpPr>
+        <p:spPr>
+          <a:xfrm>
+            <a:off x="15836" y="1164134"/>
+            <a:ext cx="4724399" cy="3293209"/>
+          </a:xfrm>
+          <a:prstGeom prst="rect">
+            <a:avLst/>
+          </a:prstGeom>
+          <a:noFill/>
+        </p:spPr>
+        <p:txBody>
+          <a:bodyPr wrap="square" rtlCol="0">
+            <a:spAutoFit/>
+          </a:bodyPr>
+          <a:lstStyle/>
+          <a:p>
+            <a:r>
+              <a:rPr lang="en-US" sz="1600" b="1" dirty="0" smtClean="0"/>
+              <a:t>function </a:t>
+            </a:r>
+            <a:r>
+              <a:rPr lang="en-US" sz="1600" b="1" dirty="0" smtClean="0">
+                <a:solidFill>
+                  <a:srgbClr val="FF0000"/>
+                </a:solidFill>
+              </a:rPr>
+              <a:t>Minimum</a:t>
+            </a:r>
+            <a:r>
+              <a:rPr lang="en-US" sz="1600" b="1" dirty="0" smtClean="0"/>
+              <a:t>(state)</a:t>
+            </a:r>
+          </a:p>
+          <a:p>
+            <a:r>
+              <a:rPr lang="en-US" sz="1600" b="1" dirty="0"/>
+              <a:t>	</a:t>
+            </a:r>
+            <a:r>
+              <a:rPr lang="en-US" sz="1600" b="1" dirty="0" smtClean="0"/>
+              <a:t>if terminal(state)</a:t>
+            </a:r>
+          </a:p>
+          <a:p>
+            <a:r>
+              <a:rPr lang="en-US" sz="1600" b="1" dirty="0"/>
+              <a:t>	</a:t>
+            </a:r>
+            <a:r>
+              <a:rPr lang="en-US" sz="1600" b="1" dirty="0" smtClean="0"/>
+              <a:t>	return (null, value(state))</a:t>
+            </a:r>
+          </a:p>
+          <a:p>
+            <a:endParaRPr lang="en-US" sz="1600" b="1" dirty="0"/>
+          </a:p>
+          <a:p>
+            <a:r>
+              <a:rPr lang="en-US" sz="1600" b="1" dirty="0" smtClean="0"/>
+              <a:t>	(</a:t>
+            </a:r>
+            <a:r>
+              <a:rPr lang="en-US" sz="1600" b="1" dirty="0" err="1" smtClean="0"/>
+              <a:t>minState</a:t>
+            </a:r>
+            <a:r>
+              <a:rPr lang="en-US" sz="1600" b="1" dirty="0" smtClean="0"/>
+              <a:t>, </a:t>
+            </a:r>
+            <a:r>
+              <a:rPr lang="en-US" sz="1600" b="1" dirty="0" err="1" smtClean="0"/>
+              <a:t>minValue</a:t>
+            </a:r>
+            <a:r>
+              <a:rPr lang="en-US" sz="1600" b="1" dirty="0" smtClean="0"/>
+              <a:t>) = (null, MAX)</a:t>
+            </a:r>
+          </a:p>
+          <a:p>
+            <a:r>
+              <a:rPr lang="en-US" sz="1600" b="1" dirty="0"/>
+              <a:t>	</a:t>
+            </a:r>
+            <a:endParaRPr lang="en-US" sz="1600" b="1" dirty="0" smtClean="0"/>
+          </a:p>
+          <a:p>
+            <a:r>
+              <a:rPr lang="en-US" sz="1600" b="1" dirty="0"/>
+              <a:t>	</a:t>
+            </a:r>
+            <a:r>
+              <a:rPr lang="en-US" sz="1600" b="1" dirty="0" smtClean="0"/>
+              <a:t>for child in </a:t>
+            </a:r>
+            <a:r>
+              <a:rPr lang="en-US" sz="1600" b="1" dirty="0" err="1" smtClean="0"/>
+              <a:t>state.children</a:t>
+            </a:r>
+            <a:endParaRPr lang="en-US" sz="1600" b="1" dirty="0" smtClean="0"/>
+          </a:p>
+          <a:p>
+            <a:r>
+              <a:rPr lang="en-US" sz="1600" b="1" dirty="0"/>
+              <a:t>	</a:t>
+            </a:r>
+            <a:r>
+              <a:rPr lang="en-US" sz="1600" b="1" dirty="0" smtClean="0"/>
+              <a:t>	(_, value) = </a:t>
+            </a:r>
+            <a:r>
+              <a:rPr lang="en-US" sz="1600" b="1" dirty="0" smtClean="0">
+                <a:solidFill>
+                  <a:srgbClr val="00B050"/>
+                </a:solidFill>
+              </a:rPr>
+              <a:t>Maximize</a:t>
+            </a:r>
+            <a:r>
+              <a:rPr lang="en-US" sz="1600" b="1" dirty="0" smtClean="0"/>
+              <a:t>(child)</a:t>
+            </a:r>
+            <a:endParaRPr lang="en-US" sz="1600" dirty="0"/>
+          </a:p>
+          <a:p>
+            <a:r>
+              <a:rPr lang="en-US" sz="1600" b="1" dirty="0" smtClean="0"/>
+              <a:t>		if value &lt; </a:t>
+            </a:r>
+            <a:r>
+              <a:rPr lang="en-US" sz="1600" b="1" dirty="0" err="1" smtClean="0"/>
+              <a:t>minValue</a:t>
+            </a:r>
+            <a:endParaRPr lang="en-US" sz="1600" b="1" dirty="0" smtClean="0"/>
+          </a:p>
+          <a:p>
+            <a:r>
+              <a:rPr lang="en-US" sz="1600" b="1" dirty="0"/>
+              <a:t>	</a:t>
+            </a:r>
+            <a:r>
+              <a:rPr lang="en-US" sz="1600" b="1" dirty="0" smtClean="0"/>
+              <a:t>		(</a:t>
+            </a:r>
+            <a:r>
+              <a:rPr lang="en-US" sz="1600" b="1" dirty="0" err="1" smtClean="0"/>
+              <a:t>minState,minValue</a:t>
+            </a:r>
+            <a:r>
+              <a:rPr lang="en-US" sz="1600" b="1" dirty="0" smtClean="0"/>
+              <a:t>) 			= (child, value)</a:t>
+            </a:r>
+          </a:p>
+          <a:p>
+            <a:endParaRPr lang="en-US" sz="1600" b="1" dirty="0"/>
+          </a:p>
+          <a:p>
+            <a:r>
+              <a:rPr lang="en-US" sz="1600" b="1" dirty="0" smtClean="0"/>
+              <a:t>	return (</a:t>
+            </a:r>
+            <a:r>
+              <a:rPr lang="en-US" sz="1600" b="1" dirty="0" err="1" smtClean="0"/>
+              <a:t>minState</a:t>
+            </a:r>
+            <a:r>
+              <a:rPr lang="en-US" sz="1600" b="1" dirty="0" smtClean="0"/>
+              <a:t>, </a:t>
+            </a:r>
+            <a:r>
+              <a:rPr lang="en-US" sz="1600" b="1" dirty="0" err="1" smtClean="0"/>
+              <a:t>minValue</a:t>
+            </a:r>
+            <a:r>
+              <a:rPr lang="en-US" sz="1600" b="1" dirty="0" smtClean="0"/>
+              <a:t>)</a:t>
+            </a:r>
+          </a:p>
+        </p:txBody>
+      </p:sp>
+      <p:sp>
+        <p:nvSpPr>
+          <p:cNvPr id="6" name="TextBox 5"/>
+          <p:cNvSpPr txBox="1"/>
+          <p:nvPr/>
+        </p:nvSpPr>
+        <p:spPr>
+          <a:xfrm>
+            <a:off x="4572000" y="1164134"/>
+            <a:ext cx="4801314" cy="3323987"/>
+          </a:xfrm>
+          <a:prstGeom prst="rect">
+            <a:avLst/>
+          </a:prstGeom>
+          <a:noFill/>
+        </p:spPr>
+        <p:txBody>
+          <a:bodyPr wrap="none" rtlCol="0">
+            <a:spAutoFit/>
+          </a:bodyPr>
+          <a:lstStyle/>
+          <a:p>
+            <a:r>
+              <a:rPr lang="en-US" sz="1600" b="1" dirty="0" smtClean="0"/>
+              <a:t>function </a:t>
+            </a:r>
+            <a:r>
+              <a:rPr lang="en-US" sz="1600" b="1" dirty="0" smtClean="0">
+                <a:solidFill>
+                  <a:srgbClr val="FF0000"/>
+                </a:solidFill>
+              </a:rPr>
+              <a:t>Maximize</a:t>
+            </a:r>
+            <a:r>
+              <a:rPr lang="en-US" sz="1600" b="1" dirty="0" smtClean="0"/>
+              <a:t>(state)</a:t>
+            </a:r>
+          </a:p>
+          <a:p>
+            <a:r>
+              <a:rPr lang="en-US" sz="1600" b="1" dirty="0"/>
+              <a:t>	</a:t>
+            </a:r>
+            <a:r>
+              <a:rPr lang="en-US" sz="1600" b="1" dirty="0" smtClean="0"/>
+              <a:t>if terminal(state)</a:t>
+            </a:r>
+          </a:p>
+          <a:p>
+            <a:r>
+              <a:rPr lang="en-US" sz="1600" b="1" dirty="0"/>
+              <a:t>	</a:t>
+            </a:r>
+            <a:r>
+              <a:rPr lang="en-US" sz="1600" b="1" dirty="0" smtClean="0"/>
+              <a:t>	return (null, value(state))</a:t>
+            </a:r>
+          </a:p>
+          <a:p>
+            <a:endParaRPr lang="en-US" sz="1600" b="1" dirty="0"/>
+          </a:p>
+          <a:p>
+            <a:r>
+              <a:rPr lang="en-US" sz="1600" b="1" dirty="0" smtClean="0"/>
+              <a:t>	(</a:t>
+            </a:r>
+            <a:r>
+              <a:rPr lang="en-US" sz="1600" b="1" dirty="0" err="1" smtClean="0"/>
+              <a:t>maxState</a:t>
+            </a:r>
+            <a:r>
+              <a:rPr lang="en-US" sz="1600" b="1" dirty="0" smtClean="0"/>
+              <a:t>, </a:t>
+            </a:r>
+            <a:r>
+              <a:rPr lang="en-US" sz="1600" b="1" dirty="0" err="1" smtClean="0"/>
+              <a:t>maxValue</a:t>
+            </a:r>
+            <a:r>
+              <a:rPr lang="en-US" sz="1600" b="1" dirty="0" smtClean="0"/>
+              <a:t>) = (null, MIN)</a:t>
+            </a:r>
+          </a:p>
+          <a:p>
+            <a:r>
+              <a:rPr lang="en-US" sz="1600" b="1" dirty="0"/>
+              <a:t>	</a:t>
+            </a:r>
+            <a:endParaRPr lang="en-US" sz="1600" b="1" dirty="0" smtClean="0"/>
+          </a:p>
+          <a:p>
+            <a:r>
+              <a:rPr lang="en-US" sz="1600" b="1" dirty="0"/>
+              <a:t>	</a:t>
+            </a:r>
+            <a:r>
+              <a:rPr lang="en-US" sz="1600" b="1" dirty="0" smtClean="0"/>
+              <a:t>for child in </a:t>
+            </a:r>
+            <a:r>
+              <a:rPr lang="en-US" sz="1600" b="1" dirty="0" err="1" smtClean="0"/>
+              <a:t>state.children</a:t>
+            </a:r>
+            <a:endParaRPr lang="en-US" sz="1600" b="1" dirty="0" smtClean="0"/>
+          </a:p>
+          <a:p>
+            <a:r>
+              <a:rPr lang="en-US" sz="1600" b="1" dirty="0"/>
+              <a:t>	</a:t>
+            </a:r>
+            <a:r>
+              <a:rPr lang="en-US" sz="1600" b="1" dirty="0" smtClean="0"/>
+              <a:t>	(_, value) = </a:t>
+            </a:r>
+            <a:r>
+              <a:rPr lang="en-US" sz="1600" b="1" dirty="0" smtClean="0">
+                <a:solidFill>
+                  <a:srgbClr val="00B050"/>
+                </a:solidFill>
+              </a:rPr>
+              <a:t>Minimize</a:t>
+            </a:r>
+            <a:r>
+              <a:rPr lang="en-US" sz="1600" b="1" dirty="0" smtClean="0"/>
+              <a:t>(child)</a:t>
+            </a:r>
+            <a:endParaRPr lang="en-US" sz="1600" dirty="0"/>
+          </a:p>
+          <a:p>
+            <a:r>
+              <a:rPr lang="en-US" sz="1600" b="1" dirty="0" smtClean="0"/>
+              <a:t>		if value &gt; </a:t>
+            </a:r>
+            <a:r>
+              <a:rPr lang="en-US" sz="1600" b="1" dirty="0" err="1" smtClean="0"/>
+              <a:t>maxValue</a:t>
+            </a:r>
+            <a:endParaRPr lang="en-US" sz="1600" b="1" dirty="0" smtClean="0"/>
+          </a:p>
+          <a:p>
+            <a:r>
+              <a:rPr lang="en-US" sz="1600" b="1" dirty="0"/>
+              <a:t>	</a:t>
+            </a:r>
+            <a:r>
+              <a:rPr lang="en-US" sz="1600" b="1" dirty="0" smtClean="0"/>
+              <a:t>		(</a:t>
+            </a:r>
+            <a:r>
+              <a:rPr lang="en-US" sz="1600" b="1" dirty="0" err="1" smtClean="0"/>
+              <a:t>maxState,maxValue</a:t>
+            </a:r>
+            <a:r>
+              <a:rPr lang="en-US" sz="1600" b="1" dirty="0" smtClean="0"/>
+              <a:t>)</a:t>
+            </a:r>
+          </a:p>
+          <a:p>
+            <a:r>
+              <a:rPr lang="en-US" sz="1600" b="1" dirty="0"/>
+              <a:t>	</a:t>
+            </a:r>
+            <a:r>
+              <a:rPr lang="en-US" sz="1600" b="1" dirty="0" smtClean="0"/>
+              <a:t>		= (child, value)</a:t>
+            </a:r>
+          </a:p>
+          <a:p>
+            <a:endParaRPr lang="en-US" sz="1600" b="1" dirty="0"/>
+          </a:p>
+          <a:p>
+            <a:r>
+              <a:rPr lang="en-US" sz="1600" b="1" dirty="0" smtClean="0"/>
+              <a:t>	return (</a:t>
+            </a:r>
+            <a:r>
+              <a:rPr lang="en-US" sz="1600" b="1" dirty="0" err="1" smtClean="0"/>
+              <a:t>maxState</a:t>
+            </a:r>
+            <a:r>
+              <a:rPr lang="en-US" sz="1600" b="1" dirty="0" smtClean="0"/>
+              <a:t>, </a:t>
+            </a:r>
+            <a:r>
+              <a:rPr lang="en-US" sz="1600" b="1" dirty="0" err="1" smtClean="0"/>
+              <a:t>maxValue</a:t>
+            </a:r>
+            <a:r>
+              <a:rPr lang="en-US" sz="1600" b="1" dirty="0" smtClean="0"/>
+              <a:t>)</a:t>
+            </a:r>
+            <a:r>
+              <a:rPr lang="en-US" b="1" dirty="0" smtClean="0"/>
+              <a:t>		</a:t>
+            </a:r>
+          </a:p>
+        </p:txBody>
+      </p:sp>
+      <p:cxnSp>
+        <p:nvCxnSpPr>
+          <p:cNvPr id="4" name="Straight Connector 3"/>
+          <p:cNvCxnSpPr/>
+          <p:nvPr/>
+        </p:nvCxnSpPr>
+        <p:spPr>
+          <a:xfrm>
+            <a:off x="4610100" y="1164134"/>
+            <a:ext cx="38100" cy="3484066"/>
+          </a:xfrm>
+          <a:prstGeom prst="line">
+            <a:avLst/>
+          </a:prstGeom>
+          <a:ln>
+            <a:solidFill>
+              <a:schemeClr val="bg1">
+                <a:lumMod val="50000"/>
+              </a:schemeClr>
+            </a:solidFill>
+            <a:prstDash val="dash"/>
+          </a:ln>
+        </p:spPr>
+        <p:style>
+          <a:lnRef idx="1">
+            <a:schemeClr val="accent1"/>
+          </a:lnRef>
+          <a:fillRef idx="0">
+            <a:schemeClr val="accent1"/>
+          </a:fillRef>
+          <a:effectRef idx="0">
+            <a:schemeClr val="accent1"/>
+          </a:effectRef>
+          <a:fontRef idx="minor">
+            <a:schemeClr val="tx1"/>
+          </a:fontRef>
+        </p:style>
+      </p:cxnSp>
+      <p:cxnSp>
+        <p:nvCxnSpPr>
+          <p:cNvPr id="19" name="Curved Connector 18"/>
+          <p:cNvCxnSpPr/>
+          <p:nvPr/>
+        </p:nvCxnSpPr>
+        <p:spPr>
+          <a:xfrm rot="5400000" flipH="1" flipV="1">
+            <a:off x="3654237" y="1603566"/>
+            <a:ext cx="1378328" cy="1066799"/>
+          </a:xfrm>
+          <a:prstGeom prst="curvedConnector3">
+            <a:avLst/>
+          </a:prstGeom>
+          <a:ln>
+            <a:solidFill>
+              <a:srgbClr val="00B050"/>
+            </a:solidFill>
+            <a:prstDash val="dash"/>
+            <a:tailEnd type="arrow"/>
+          </a:ln>
+        </p:spPr>
+        <p:style>
+          <a:lnRef idx="1">
+            <a:schemeClr val="accent1"/>
+          </a:lnRef>
+          <a:fillRef idx="0">
+            <a:schemeClr val="accent1"/>
+          </a:fillRef>
+          <a:effectRef idx="0">
+            <a:schemeClr val="accent1"/>
+          </a:effectRef>
+          <a:fontRef idx="minor">
+            <a:schemeClr val="tx1"/>
+          </a:fontRef>
+        </p:style>
+      </p:cxnSp>
+      <p:cxnSp>
+        <p:nvCxnSpPr>
+          <p:cNvPr id="22" name="Curved Connector 21"/>
+          <p:cNvCxnSpPr/>
+          <p:nvPr/>
+        </p:nvCxnSpPr>
+        <p:spPr>
+          <a:xfrm rot="10800000">
+            <a:off x="2378035" y="1295403"/>
+            <a:ext cx="4061222" cy="1835529"/>
+          </a:xfrm>
+          <a:prstGeom prst="curvedConnector3">
+            <a:avLst/>
+          </a:prstGeom>
+          <a:ln>
+            <a:solidFill>
+              <a:srgbClr val="FF0000"/>
+            </a:solidFill>
+            <a:prstDash val="dash"/>
+            <a:tailEnd type="arrow"/>
+          </a:ln>
+        </p:spPr>
+        <p:style>
+          <a:lnRef idx="1">
+            <a:schemeClr val="accent1"/>
+          </a:lnRef>
+          <a:fillRef idx="0">
+            <a:schemeClr val="accent1"/>
+          </a:fillRef>
+          <a:effectRef idx="0">
+            <a:schemeClr val="accent1"/>
+          </a:effectRef>
+          <a:fontRef idx="minor">
+            <a:schemeClr val="tx1"/>
+          </a:fontRef>
+        </p:style>
+      </p:cxnSp>
+      <p:cxnSp>
+        <p:nvCxnSpPr>
+          <p:cNvPr id="25" name="Straight Connector 24"/>
+          <p:cNvCxnSpPr/>
+          <p:nvPr/>
+        </p:nvCxnSpPr>
+        <p:spPr>
+          <a:xfrm flipH="1">
+            <a:off x="381001" y="4648200"/>
+            <a:ext cx="8458199" cy="0"/>
+          </a:xfrm>
+          <a:prstGeom prst="line">
+            <a:avLst/>
+          </a:prstGeom>
+          <a:ln>
+            <a:solidFill>
+              <a:schemeClr val="bg1">
+                <a:lumMod val="50000"/>
+              </a:schemeClr>
+            </a:solidFill>
+            <a:prstDash val="dash"/>
+          </a:ln>
+        </p:spPr>
+        <p:style>
+          <a:lnRef idx="1">
+            <a:schemeClr val="accent1"/>
+          </a:lnRef>
+          <a:fillRef idx="0">
+            <a:schemeClr val="accent1"/>
+          </a:fillRef>
+          <a:effectRef idx="0">
+            <a:schemeClr val="accent1"/>
+          </a:effectRef>
+          <a:fontRef idx="minor">
+            <a:schemeClr val="tx1"/>
+          </a:fontRef>
+        </p:style>
+      </p:cxnSp>
+      <p:sp>
+        <p:nvSpPr>
+          <p:cNvPr id="29" name="TextBox 28"/>
+          <p:cNvSpPr txBox="1"/>
+          <p:nvPr/>
+        </p:nvSpPr>
+        <p:spPr>
+          <a:xfrm>
+            <a:off x="3173450" y="5029199"/>
+            <a:ext cx="3406702" cy="1323439"/>
+          </a:xfrm>
+          <a:prstGeom prst="rect">
+            <a:avLst/>
+          </a:prstGeom>
+          <a:noFill/>
+        </p:spPr>
+        <p:txBody>
+          <a:bodyPr wrap="none" rtlCol="0">
+            <a:spAutoFit/>
+          </a:bodyPr>
+          <a:lstStyle/>
+          <a:p>
+            <a:r>
+              <a:rPr lang="en-US" sz="1600" b="1" dirty="0" smtClean="0"/>
+              <a:t>function Minimax(state)</a:t>
+            </a:r>
+          </a:p>
+          <a:p>
+            <a:endParaRPr lang="en-US" sz="1600" b="1" dirty="0"/>
+          </a:p>
+          <a:p>
+            <a:r>
+              <a:rPr lang="en-US" sz="1600" b="1" dirty="0" smtClean="0"/>
+              <a:t>	(child, _) = </a:t>
+            </a:r>
+            <a:r>
+              <a:rPr lang="en-US" sz="1600" b="1" dirty="0" smtClean="0">
+                <a:solidFill>
+                  <a:srgbClr val="00B050"/>
+                </a:solidFill>
+              </a:rPr>
+              <a:t>Maximize</a:t>
+            </a:r>
+            <a:r>
+              <a:rPr lang="en-US" sz="1600" b="1" dirty="0" smtClean="0"/>
+              <a:t>(state)</a:t>
+            </a:r>
+          </a:p>
+          <a:p>
+            <a:endParaRPr lang="en-US" sz="1600" b="1" dirty="0"/>
+          </a:p>
+          <a:p>
+            <a:r>
+              <a:rPr lang="en-US" sz="1600" b="1" dirty="0" smtClean="0"/>
+              <a:t>	return child</a:t>
+            </a:r>
+            <a:endParaRPr lang="en-US" sz="1600" b="1" dirty="0"/>
+          </a:p>
+        </p:txBody>
+      </p:sp>
+    </p:spTree>
+    <p:extLst>
+      <p:ext uri="{BB962C8B-B14F-4D97-AF65-F5344CB8AC3E}">
+        <p14:creationId xmlns:p14="http://schemas.microsoft.com/office/powerpoint/2010/main" val="259087862"/>
       </p:ext>
     </p:extLst>
   </p:cSld>

</xml_diff>